<commit_message>
Doc : How to protect REST.API service from undesirable clients
</commit_message>
<xml_diff>
--- a/Schemas.pptx
+++ b/Schemas.pptx
@@ -10,6 +10,8 @@
     <p:sldId id="258" r:id="rId4"/>
     <p:sldId id="259" r:id="rId5"/>
     <p:sldId id="260" r:id="rId6"/>
+    <p:sldId id="261" r:id="rId7"/>
+    <p:sldId id="262" r:id="rId8"/>
   </p:sldIdLst>
   <p:sldSz cx="12192000" cy="6858000"/>
   <p:notesSz cx="6858000" cy="9144000"/>
@@ -265,7 +267,7 @@
           <a:p>
             <a:fld id="{B57FDF2F-3811-43EF-B385-B34B7A385512}" type="datetimeFigureOut">
               <a:rPr lang="fr-BE" smtClean="0"/>
-              <a:t>31-10-19</a:t>
+              <a:t>01-11-19</a:t>
             </a:fld>
             <a:endParaRPr lang="fr-BE"/>
           </a:p>
@@ -465,7 +467,7 @@
           <a:p>
             <a:fld id="{B57FDF2F-3811-43EF-B385-B34B7A385512}" type="datetimeFigureOut">
               <a:rPr lang="fr-BE" smtClean="0"/>
-              <a:t>31-10-19</a:t>
+              <a:t>01-11-19</a:t>
             </a:fld>
             <a:endParaRPr lang="fr-BE"/>
           </a:p>
@@ -675,7 +677,7 @@
           <a:p>
             <a:fld id="{B57FDF2F-3811-43EF-B385-B34B7A385512}" type="datetimeFigureOut">
               <a:rPr lang="fr-BE" smtClean="0"/>
-              <a:t>31-10-19</a:t>
+              <a:t>01-11-19</a:t>
             </a:fld>
             <a:endParaRPr lang="fr-BE"/>
           </a:p>
@@ -875,7 +877,7 @@
           <a:p>
             <a:fld id="{B57FDF2F-3811-43EF-B385-B34B7A385512}" type="datetimeFigureOut">
               <a:rPr lang="fr-BE" smtClean="0"/>
-              <a:t>31-10-19</a:t>
+              <a:t>01-11-19</a:t>
             </a:fld>
             <a:endParaRPr lang="fr-BE"/>
           </a:p>
@@ -1151,7 +1153,7 @@
           <a:p>
             <a:fld id="{B57FDF2F-3811-43EF-B385-B34B7A385512}" type="datetimeFigureOut">
               <a:rPr lang="fr-BE" smtClean="0"/>
-              <a:t>31-10-19</a:t>
+              <a:t>01-11-19</a:t>
             </a:fld>
             <a:endParaRPr lang="fr-BE"/>
           </a:p>
@@ -1419,7 +1421,7 @@
           <a:p>
             <a:fld id="{B57FDF2F-3811-43EF-B385-B34B7A385512}" type="datetimeFigureOut">
               <a:rPr lang="fr-BE" smtClean="0"/>
-              <a:t>31-10-19</a:t>
+              <a:t>01-11-19</a:t>
             </a:fld>
             <a:endParaRPr lang="fr-BE"/>
           </a:p>
@@ -1834,7 +1836,7 @@
           <a:p>
             <a:fld id="{B57FDF2F-3811-43EF-B385-B34B7A385512}" type="datetimeFigureOut">
               <a:rPr lang="fr-BE" smtClean="0"/>
-              <a:t>31-10-19</a:t>
+              <a:t>01-11-19</a:t>
             </a:fld>
             <a:endParaRPr lang="fr-BE"/>
           </a:p>
@@ -1976,7 +1978,7 @@
           <a:p>
             <a:fld id="{B57FDF2F-3811-43EF-B385-B34B7A385512}" type="datetimeFigureOut">
               <a:rPr lang="fr-BE" smtClean="0"/>
-              <a:t>31-10-19</a:t>
+              <a:t>01-11-19</a:t>
             </a:fld>
             <a:endParaRPr lang="fr-BE"/>
           </a:p>
@@ -2089,7 +2091,7 @@
           <a:p>
             <a:fld id="{B57FDF2F-3811-43EF-B385-B34B7A385512}" type="datetimeFigureOut">
               <a:rPr lang="fr-BE" smtClean="0"/>
-              <a:t>31-10-19</a:t>
+              <a:t>01-11-19</a:t>
             </a:fld>
             <a:endParaRPr lang="fr-BE"/>
           </a:p>
@@ -2402,7 +2404,7 @@
           <a:p>
             <a:fld id="{B57FDF2F-3811-43EF-B385-B34B7A385512}" type="datetimeFigureOut">
               <a:rPr lang="fr-BE" smtClean="0"/>
-              <a:t>31-10-19</a:t>
+              <a:t>01-11-19</a:t>
             </a:fld>
             <a:endParaRPr lang="fr-BE"/>
           </a:p>
@@ -2691,7 +2693,7 @@
           <a:p>
             <a:fld id="{B57FDF2F-3811-43EF-B385-B34B7A385512}" type="datetimeFigureOut">
               <a:rPr lang="fr-BE" smtClean="0"/>
-              <a:t>31-10-19</a:t>
+              <a:t>01-11-19</a:t>
             </a:fld>
             <a:endParaRPr lang="fr-BE"/>
           </a:p>
@@ -2934,7 +2936,7 @@
           <a:p>
             <a:fld id="{B57FDF2F-3811-43EF-B385-B34B7A385512}" type="datetimeFigureOut">
               <a:rPr lang="fr-BE" smtClean="0"/>
-              <a:t>31-10-19</a:t>
+              <a:t>01-11-19</a:t>
             </a:fld>
             <a:endParaRPr lang="fr-BE"/>
           </a:p>
@@ -8927,6 +8929,1364 @@
 </p:sld>
 </file>
 
+<file path=ppt/slides/slide6.xml><?xml version="1.0" encoding="utf-8"?>
+<p:sld xmlns:a="http://schemas.openxmlformats.org/drawingml/2006/main" xmlns:r="http://schemas.openxmlformats.org/officeDocument/2006/relationships" xmlns:p="http://schemas.openxmlformats.org/presentationml/2006/main">
+  <p:cSld>
+    <p:spTree>
+      <p:nvGrpSpPr>
+        <p:cNvPr id="1" name=""/>
+        <p:cNvGrpSpPr/>
+        <p:nvPr/>
+      </p:nvGrpSpPr>
+      <p:grpSpPr>
+        <a:xfrm>
+          <a:off x="0" y="0"/>
+          <a:ext cx="0" cy="0"/>
+          <a:chOff x="0" y="0"/>
+          <a:chExt cx="0" cy="0"/>
+        </a:xfrm>
+      </p:grpSpPr>
+      <p:grpSp>
+        <p:nvGrpSpPr>
+          <p:cNvPr id="4" name="Groupe 3">
+            <a:extLst>
+              <a:ext uri="{FF2B5EF4-FFF2-40B4-BE49-F238E27FC236}">
+                <a16:creationId xmlns:a16="http://schemas.microsoft.com/office/drawing/2014/main" id="{6C31D1FA-23B0-4280-A72E-CF5B282AFB67}"/>
+              </a:ext>
+            </a:extLst>
+          </p:cNvPr>
+          <p:cNvGrpSpPr/>
+          <p:nvPr/>
+        </p:nvGrpSpPr>
+        <p:grpSpPr>
+          <a:xfrm>
+            <a:off x="4085211" y="2496973"/>
+            <a:ext cx="1228725" cy="1099185"/>
+            <a:chOff x="4085211" y="2496973"/>
+            <a:chExt cx="1228725" cy="1099185"/>
+          </a:xfrm>
+        </p:grpSpPr>
+        <p:sp>
+          <p:nvSpPr>
+            <p:cNvPr id="5" name="Rectangle 4">
+              <a:extLst>
+                <a:ext uri="{FF2B5EF4-FFF2-40B4-BE49-F238E27FC236}">
+                  <a16:creationId xmlns:a16="http://schemas.microsoft.com/office/drawing/2014/main" id="{38543574-5962-4B6A-B500-15BB4D46F327}"/>
+                </a:ext>
+              </a:extLst>
+            </p:cNvPr>
+            <p:cNvSpPr/>
+            <p:nvPr/>
+          </p:nvSpPr>
+          <p:spPr>
+            <a:xfrm>
+              <a:off x="4085211" y="2496973"/>
+              <a:ext cx="1228725" cy="1099185"/>
+            </a:xfrm>
+            <a:prstGeom prst="rect">
+              <a:avLst/>
+            </a:prstGeom>
+            <a:noFill/>
+            <a:ln>
+              <a:solidFill>
+                <a:schemeClr val="tx1"/>
+              </a:solidFill>
+            </a:ln>
+          </p:spPr>
+          <p:style>
+            <a:lnRef idx="2">
+              <a:schemeClr val="accent1">
+                <a:shade val="50000"/>
+              </a:schemeClr>
+            </a:lnRef>
+            <a:fillRef idx="1">
+              <a:schemeClr val="accent1"/>
+            </a:fillRef>
+            <a:effectRef idx="0">
+              <a:schemeClr val="accent1"/>
+            </a:effectRef>
+            <a:fontRef idx="minor">
+              <a:schemeClr val="lt1"/>
+            </a:fontRef>
+          </p:style>
+          <p:txBody>
+            <a:bodyPr rot="0" spcFirstLastPara="0" vert="horz" wrap="square" lIns="91440" tIns="45720" rIns="91440" bIns="45720" numCol="1" spcCol="0" rtlCol="0" fromWordArt="0" anchor="b" anchorCtr="0" forceAA="0" compatLnSpc="1">
+              <a:prstTxWarp prst="textNoShape">
+                <a:avLst/>
+              </a:prstTxWarp>
+              <a:noAutofit/>
+            </a:bodyPr>
+            <a:lstStyle/>
+            <a:p>
+              <a:pPr algn="ctr"/>
+              <a:r>
+                <a:rPr lang="en-US" sz="1600" dirty="0">
+                  <a:solidFill>
+                    <a:schemeClr val="tx1"/>
+                  </a:solidFill>
+                </a:rPr>
+                <a:t>Users API</a:t>
+              </a:r>
+            </a:p>
+          </p:txBody>
+        </p:sp>
+        <p:pic>
+          <p:nvPicPr>
+            <p:cNvPr id="6" name="Picture 2" descr="Résultat de recherche d'images pour &quot;asp.net core logo svg&quot;&quot;">
+              <a:extLst>
+                <a:ext uri="{FF2B5EF4-FFF2-40B4-BE49-F238E27FC236}">
+                  <a16:creationId xmlns:a16="http://schemas.microsoft.com/office/drawing/2014/main" id="{EC13D5D7-8A3C-49C0-B481-5809F0AFE125}"/>
+                </a:ext>
+              </a:extLst>
+            </p:cNvPr>
+            <p:cNvPicPr>
+              <a:picLocks noChangeAspect="1" noChangeArrowheads="1"/>
+            </p:cNvPicPr>
+            <p:nvPr/>
+          </p:nvPicPr>
+          <p:blipFill>
+            <a:blip r:embed="rId2">
+              <a:extLst>
+                <a:ext uri="{28A0092B-C50C-407E-A947-70E740481C1C}">
+                  <a14:useLocalDpi xmlns:a14="http://schemas.microsoft.com/office/drawing/2010/main" val="0"/>
+                </a:ext>
+              </a:extLst>
+            </a:blip>
+            <a:srcRect/>
+            <a:stretch>
+              <a:fillRect/>
+            </a:stretch>
+          </p:blipFill>
+          <p:spPr bwMode="auto">
+            <a:xfrm>
+              <a:off x="4136347" y="2753957"/>
+              <a:ext cx="1103929" cy="292608"/>
+            </a:xfrm>
+            <a:prstGeom prst="rect">
+              <a:avLst/>
+            </a:prstGeom>
+            <a:noFill/>
+            <a:extLst>
+              <a:ext uri="{909E8E84-426E-40DD-AFC4-6F175D3DCCD1}">
+                <a14:hiddenFill xmlns:a14="http://schemas.microsoft.com/office/drawing/2010/main">
+                  <a:solidFill>
+                    <a:srgbClr val="FFFFFF"/>
+                  </a:solidFill>
+                </a14:hiddenFill>
+              </a:ext>
+            </a:extLst>
+          </p:spPr>
+        </p:pic>
+      </p:grpSp>
+      <p:grpSp>
+        <p:nvGrpSpPr>
+          <p:cNvPr id="10" name="Groupe 9">
+            <a:extLst>
+              <a:ext uri="{FF2B5EF4-FFF2-40B4-BE49-F238E27FC236}">
+                <a16:creationId xmlns:a16="http://schemas.microsoft.com/office/drawing/2014/main" id="{281B76BA-4AC6-4AB9-8D04-1CF4D6F42053}"/>
+              </a:ext>
+            </a:extLst>
+          </p:cNvPr>
+          <p:cNvGrpSpPr/>
+          <p:nvPr/>
+        </p:nvGrpSpPr>
+        <p:grpSpPr>
+          <a:xfrm>
+            <a:off x="4085211" y="4648861"/>
+            <a:ext cx="1228725" cy="1099185"/>
+            <a:chOff x="4085211" y="4648861"/>
+            <a:chExt cx="1228725" cy="1099185"/>
+          </a:xfrm>
+        </p:grpSpPr>
+        <p:sp>
+          <p:nvSpPr>
+            <p:cNvPr id="8" name="Rectangle 7">
+              <a:extLst>
+                <a:ext uri="{FF2B5EF4-FFF2-40B4-BE49-F238E27FC236}">
+                  <a16:creationId xmlns:a16="http://schemas.microsoft.com/office/drawing/2014/main" id="{61F00722-52E5-4587-A1BC-07E3519C520C}"/>
+                </a:ext>
+              </a:extLst>
+            </p:cNvPr>
+            <p:cNvSpPr/>
+            <p:nvPr/>
+          </p:nvSpPr>
+          <p:spPr>
+            <a:xfrm>
+              <a:off x="4085211" y="4648861"/>
+              <a:ext cx="1228725" cy="1099185"/>
+            </a:xfrm>
+            <a:prstGeom prst="rect">
+              <a:avLst/>
+            </a:prstGeom>
+            <a:noFill/>
+            <a:ln>
+              <a:solidFill>
+                <a:schemeClr val="tx1"/>
+              </a:solidFill>
+            </a:ln>
+          </p:spPr>
+          <p:style>
+            <a:lnRef idx="2">
+              <a:schemeClr val="accent1">
+                <a:shade val="50000"/>
+              </a:schemeClr>
+            </a:lnRef>
+            <a:fillRef idx="1">
+              <a:schemeClr val="accent1"/>
+            </a:fillRef>
+            <a:effectRef idx="0">
+              <a:schemeClr val="accent1"/>
+            </a:effectRef>
+            <a:fontRef idx="minor">
+              <a:schemeClr val="lt1"/>
+            </a:fontRef>
+          </p:style>
+          <p:txBody>
+            <a:bodyPr rot="0" spcFirstLastPara="0" vert="horz" wrap="square" lIns="91440" tIns="45720" rIns="91440" bIns="45720" numCol="1" spcCol="0" rtlCol="0" fromWordArt="0" anchor="b" anchorCtr="0" forceAA="0" compatLnSpc="1">
+              <a:prstTxWarp prst="textNoShape">
+                <a:avLst/>
+              </a:prstTxWarp>
+              <a:noAutofit/>
+            </a:bodyPr>
+            <a:lstStyle/>
+            <a:p>
+              <a:pPr algn="ctr"/>
+              <a:r>
+                <a:rPr lang="en-US" sz="1600" dirty="0">
+                  <a:solidFill>
+                    <a:schemeClr val="tx1"/>
+                  </a:solidFill>
+                </a:rPr>
+                <a:t>Client</a:t>
+              </a:r>
+            </a:p>
+          </p:txBody>
+        </p:sp>
+        <p:pic>
+          <p:nvPicPr>
+            <p:cNvPr id="1026" name="Picture 2">
+              <a:extLst>
+                <a:ext uri="{FF2B5EF4-FFF2-40B4-BE49-F238E27FC236}">
+                  <a16:creationId xmlns:a16="http://schemas.microsoft.com/office/drawing/2014/main" id="{BF0E47B6-5751-4A5F-A6EE-ABA6FAF808E0}"/>
+                </a:ext>
+              </a:extLst>
+            </p:cNvPr>
+            <p:cNvPicPr>
+              <a:picLocks noChangeAspect="1" noChangeArrowheads="1"/>
+            </p:cNvPicPr>
+            <p:nvPr/>
+          </p:nvPicPr>
+          <p:blipFill>
+            <a:blip r:embed="rId3">
+              <a:extLst>
+                <a:ext uri="{28A0092B-C50C-407E-A947-70E740481C1C}">
+                  <a14:useLocalDpi xmlns:a14="http://schemas.microsoft.com/office/drawing/2010/main" val="0"/>
+                </a:ext>
+              </a:extLst>
+            </a:blip>
+            <a:srcRect/>
+            <a:stretch>
+              <a:fillRect/>
+            </a:stretch>
+          </p:blipFill>
+          <p:spPr bwMode="auto">
+            <a:xfrm>
+              <a:off x="4427018" y="4768685"/>
+              <a:ext cx="547318" cy="547318"/>
+            </a:xfrm>
+            <a:prstGeom prst="rect">
+              <a:avLst/>
+            </a:prstGeom>
+            <a:noFill/>
+            <a:extLst>
+              <a:ext uri="{909E8E84-426E-40DD-AFC4-6F175D3DCCD1}">
+                <a14:hiddenFill xmlns:a14="http://schemas.microsoft.com/office/drawing/2010/main">
+                  <a:solidFill>
+                    <a:srgbClr val="FFFFFF"/>
+                  </a:solidFill>
+                </a14:hiddenFill>
+              </a:ext>
+            </a:extLst>
+          </p:spPr>
+        </p:pic>
+      </p:grpSp>
+      <p:grpSp>
+        <p:nvGrpSpPr>
+          <p:cNvPr id="12" name="Groupe 37">
+            <a:extLst>
+              <a:ext uri="{FF2B5EF4-FFF2-40B4-BE49-F238E27FC236}">
+                <a16:creationId xmlns:a16="http://schemas.microsoft.com/office/drawing/2014/main" id="{24FD72D1-8841-496B-ABA0-ED6FC2C57607}"/>
+              </a:ext>
+            </a:extLst>
+          </p:cNvPr>
+          <p:cNvGrpSpPr/>
+          <p:nvPr/>
+        </p:nvGrpSpPr>
+        <p:grpSpPr>
+          <a:xfrm>
+            <a:off x="4073948" y="345085"/>
+            <a:ext cx="1228725" cy="1099185"/>
+            <a:chOff x="3419872" y="1700808"/>
+            <a:chExt cx="1228725" cy="1099185"/>
+          </a:xfrm>
+        </p:grpSpPr>
+        <p:pic>
+          <p:nvPicPr>
+            <p:cNvPr id="13" name="Picture 2" descr="RÃ©sultat de recherche d'images pour &quot;oauth 2.0&quot;">
+              <a:extLst>
+                <a:ext uri="{FF2B5EF4-FFF2-40B4-BE49-F238E27FC236}">
+                  <a16:creationId xmlns:a16="http://schemas.microsoft.com/office/drawing/2014/main" id="{55B0FCB6-D2B2-4E9D-B94B-200838B2D49C}"/>
+                </a:ext>
+              </a:extLst>
+            </p:cNvPr>
+            <p:cNvPicPr>
+              <a:picLocks noChangeAspect="1" noChangeArrowheads="1"/>
+            </p:cNvPicPr>
+            <p:nvPr/>
+          </p:nvPicPr>
+          <p:blipFill>
+            <a:blip r:embed="rId4" cstate="print">
+              <a:extLst>
+                <a:ext uri="{28A0092B-C50C-407E-A947-70E740481C1C}">
+                  <a14:useLocalDpi xmlns:a14="http://schemas.microsoft.com/office/drawing/2010/main" val="0"/>
+                </a:ext>
+              </a:extLst>
+            </a:blip>
+            <a:srcRect/>
+            <a:stretch>
+              <a:fillRect/>
+            </a:stretch>
+          </p:blipFill>
+          <p:spPr bwMode="auto">
+            <a:xfrm>
+              <a:off x="3674194" y="1772816"/>
+              <a:ext cx="720080" cy="717165"/>
+            </a:xfrm>
+            <a:prstGeom prst="rect">
+              <a:avLst/>
+            </a:prstGeom>
+            <a:noFill/>
+            <a:extLst>
+              <a:ext uri="{909E8E84-426E-40DD-AFC4-6F175D3DCCD1}">
+                <a14:hiddenFill xmlns:a14="http://schemas.microsoft.com/office/drawing/2010/main">
+                  <a:solidFill>
+                    <a:srgbClr val="FFFFFF"/>
+                  </a:solidFill>
+                </a14:hiddenFill>
+              </a:ext>
+            </a:extLst>
+          </p:spPr>
+        </p:pic>
+        <p:sp>
+          <p:nvSpPr>
+            <p:cNvPr id="14" name="Rectangle 13">
+              <a:extLst>
+                <a:ext uri="{FF2B5EF4-FFF2-40B4-BE49-F238E27FC236}">
+                  <a16:creationId xmlns:a16="http://schemas.microsoft.com/office/drawing/2014/main" id="{3EF4960B-37CB-47D5-802F-59098C9F18DB}"/>
+                </a:ext>
+              </a:extLst>
+            </p:cNvPr>
+            <p:cNvSpPr/>
+            <p:nvPr/>
+          </p:nvSpPr>
+          <p:spPr>
+            <a:xfrm>
+              <a:off x="3419872" y="1700808"/>
+              <a:ext cx="1228725" cy="1099185"/>
+            </a:xfrm>
+            <a:prstGeom prst="rect">
+              <a:avLst/>
+            </a:prstGeom>
+            <a:noFill/>
+            <a:ln>
+              <a:solidFill>
+                <a:schemeClr val="tx1"/>
+              </a:solidFill>
+            </a:ln>
+          </p:spPr>
+          <p:style>
+            <a:lnRef idx="2">
+              <a:schemeClr val="accent1">
+                <a:shade val="50000"/>
+              </a:schemeClr>
+            </a:lnRef>
+            <a:fillRef idx="1">
+              <a:schemeClr val="accent1"/>
+            </a:fillRef>
+            <a:effectRef idx="0">
+              <a:schemeClr val="accent1"/>
+            </a:effectRef>
+            <a:fontRef idx="minor">
+              <a:schemeClr val="lt1"/>
+            </a:fontRef>
+          </p:style>
+          <p:txBody>
+            <a:bodyPr rot="0" spcFirstLastPara="0" vert="horz" wrap="square" lIns="91440" tIns="45720" rIns="91440" bIns="45720" numCol="1" spcCol="0" rtlCol="0" fromWordArt="0" anchor="b" anchorCtr="0" forceAA="0" compatLnSpc="1">
+              <a:prstTxWarp prst="textNoShape">
+                <a:avLst/>
+              </a:prstTxWarp>
+              <a:noAutofit/>
+            </a:bodyPr>
+            <a:lstStyle/>
+            <a:p>
+              <a:pPr algn="ctr"/>
+              <a:r>
+                <a:rPr lang="en-US" sz="1600" dirty="0">
+                  <a:solidFill>
+                    <a:schemeClr val="tx1"/>
+                  </a:solidFill>
+                </a:rPr>
+                <a:t>OAUTH2.0</a:t>
+              </a:r>
+            </a:p>
+          </p:txBody>
+        </p:sp>
+      </p:grpSp>
+    </p:spTree>
+    <p:extLst>
+      <p:ext uri="{BB962C8B-B14F-4D97-AF65-F5344CB8AC3E}">
+        <p14:creationId xmlns:p14="http://schemas.microsoft.com/office/powerpoint/2010/main" val="491694015"/>
+      </p:ext>
+    </p:extLst>
+  </p:cSld>
+  <p:clrMapOvr>
+    <a:masterClrMapping/>
+  </p:clrMapOvr>
+</p:sld>
+</file>
+
+<file path=ppt/slides/slide7.xml><?xml version="1.0" encoding="utf-8"?>
+<p:sld xmlns:a="http://schemas.openxmlformats.org/drawingml/2006/main" xmlns:r="http://schemas.openxmlformats.org/officeDocument/2006/relationships" xmlns:p="http://schemas.openxmlformats.org/presentationml/2006/main">
+  <p:cSld>
+    <p:spTree>
+      <p:nvGrpSpPr>
+        <p:cNvPr id="1" name=""/>
+        <p:cNvGrpSpPr/>
+        <p:nvPr/>
+      </p:nvGrpSpPr>
+      <p:grpSpPr>
+        <a:xfrm>
+          <a:off x="0" y="0"/>
+          <a:ext cx="0" cy="0"/>
+          <a:chOff x="0" y="0"/>
+          <a:chExt cx="0" cy="0"/>
+        </a:xfrm>
+      </p:grpSpPr>
+      <p:grpSp>
+        <p:nvGrpSpPr>
+          <p:cNvPr id="4" name="Groupe 3">
+            <a:extLst>
+              <a:ext uri="{FF2B5EF4-FFF2-40B4-BE49-F238E27FC236}">
+                <a16:creationId xmlns:a16="http://schemas.microsoft.com/office/drawing/2014/main" id="{7C2107D0-8F3A-4DC2-8E69-0964E8CB7163}"/>
+              </a:ext>
+            </a:extLst>
+          </p:cNvPr>
+          <p:cNvGrpSpPr/>
+          <p:nvPr/>
+        </p:nvGrpSpPr>
+        <p:grpSpPr>
+          <a:xfrm>
+            <a:off x="4085211" y="2496973"/>
+            <a:ext cx="1228725" cy="1099185"/>
+            <a:chOff x="4085211" y="2496973"/>
+            <a:chExt cx="1228725" cy="1099185"/>
+          </a:xfrm>
+        </p:grpSpPr>
+        <p:sp>
+          <p:nvSpPr>
+            <p:cNvPr id="5" name="Rectangle 4">
+              <a:extLst>
+                <a:ext uri="{FF2B5EF4-FFF2-40B4-BE49-F238E27FC236}">
+                  <a16:creationId xmlns:a16="http://schemas.microsoft.com/office/drawing/2014/main" id="{6851D926-B23A-4ADB-B40F-A5218F8E25F5}"/>
+                </a:ext>
+              </a:extLst>
+            </p:cNvPr>
+            <p:cNvSpPr/>
+            <p:nvPr/>
+          </p:nvSpPr>
+          <p:spPr>
+            <a:xfrm>
+              <a:off x="4085211" y="2496973"/>
+              <a:ext cx="1228725" cy="1099185"/>
+            </a:xfrm>
+            <a:prstGeom prst="rect">
+              <a:avLst/>
+            </a:prstGeom>
+            <a:noFill/>
+            <a:ln>
+              <a:solidFill>
+                <a:schemeClr val="tx1"/>
+              </a:solidFill>
+            </a:ln>
+          </p:spPr>
+          <p:style>
+            <a:lnRef idx="2">
+              <a:schemeClr val="accent1">
+                <a:shade val="50000"/>
+              </a:schemeClr>
+            </a:lnRef>
+            <a:fillRef idx="1">
+              <a:schemeClr val="accent1"/>
+            </a:fillRef>
+            <a:effectRef idx="0">
+              <a:schemeClr val="accent1"/>
+            </a:effectRef>
+            <a:fontRef idx="minor">
+              <a:schemeClr val="lt1"/>
+            </a:fontRef>
+          </p:style>
+          <p:txBody>
+            <a:bodyPr rot="0" spcFirstLastPara="0" vert="horz" wrap="square" lIns="91440" tIns="45720" rIns="91440" bIns="45720" numCol="1" spcCol="0" rtlCol="0" fromWordArt="0" anchor="b" anchorCtr="0" forceAA="0" compatLnSpc="1">
+              <a:prstTxWarp prst="textNoShape">
+                <a:avLst/>
+              </a:prstTxWarp>
+              <a:noAutofit/>
+            </a:bodyPr>
+            <a:lstStyle/>
+            <a:p>
+              <a:pPr algn="ctr"/>
+              <a:r>
+                <a:rPr lang="en-US" sz="1600" dirty="0">
+                  <a:solidFill>
+                    <a:schemeClr val="tx1"/>
+                  </a:solidFill>
+                </a:rPr>
+                <a:t>Users API</a:t>
+              </a:r>
+            </a:p>
+          </p:txBody>
+        </p:sp>
+        <p:pic>
+          <p:nvPicPr>
+            <p:cNvPr id="6" name="Picture 2" descr="Résultat de recherche d'images pour &quot;asp.net core logo svg&quot;&quot;">
+              <a:extLst>
+                <a:ext uri="{FF2B5EF4-FFF2-40B4-BE49-F238E27FC236}">
+                  <a16:creationId xmlns:a16="http://schemas.microsoft.com/office/drawing/2014/main" id="{513B62D8-2E17-41E1-8B38-E65123DDD302}"/>
+                </a:ext>
+              </a:extLst>
+            </p:cNvPr>
+            <p:cNvPicPr>
+              <a:picLocks noChangeAspect="1" noChangeArrowheads="1"/>
+            </p:cNvPicPr>
+            <p:nvPr/>
+          </p:nvPicPr>
+          <p:blipFill>
+            <a:blip r:embed="rId2">
+              <a:extLst>
+                <a:ext uri="{28A0092B-C50C-407E-A947-70E740481C1C}">
+                  <a14:useLocalDpi xmlns:a14="http://schemas.microsoft.com/office/drawing/2010/main" val="0"/>
+                </a:ext>
+              </a:extLst>
+            </a:blip>
+            <a:srcRect/>
+            <a:stretch>
+              <a:fillRect/>
+            </a:stretch>
+          </p:blipFill>
+          <p:spPr bwMode="auto">
+            <a:xfrm>
+              <a:off x="4136347" y="2753957"/>
+              <a:ext cx="1103929" cy="292608"/>
+            </a:xfrm>
+            <a:prstGeom prst="rect">
+              <a:avLst/>
+            </a:prstGeom>
+            <a:noFill/>
+            <a:extLst>
+              <a:ext uri="{909E8E84-426E-40DD-AFC4-6F175D3DCCD1}">
+                <a14:hiddenFill xmlns:a14="http://schemas.microsoft.com/office/drawing/2010/main">
+                  <a:solidFill>
+                    <a:srgbClr val="FFFFFF"/>
+                  </a:solidFill>
+                </a14:hiddenFill>
+              </a:ext>
+            </a:extLst>
+          </p:spPr>
+        </p:pic>
+      </p:grpSp>
+      <p:grpSp>
+        <p:nvGrpSpPr>
+          <p:cNvPr id="7" name="Groupe 6">
+            <a:extLst>
+              <a:ext uri="{FF2B5EF4-FFF2-40B4-BE49-F238E27FC236}">
+                <a16:creationId xmlns:a16="http://schemas.microsoft.com/office/drawing/2014/main" id="{20292F33-B7D2-49D9-B48A-B6A505B9584B}"/>
+              </a:ext>
+            </a:extLst>
+          </p:cNvPr>
+          <p:cNvGrpSpPr/>
+          <p:nvPr/>
+        </p:nvGrpSpPr>
+        <p:grpSpPr>
+          <a:xfrm>
+            <a:off x="4085211" y="4648861"/>
+            <a:ext cx="1228725" cy="1099185"/>
+            <a:chOff x="4085211" y="4648861"/>
+            <a:chExt cx="1228725" cy="1099185"/>
+          </a:xfrm>
+        </p:grpSpPr>
+        <p:sp>
+          <p:nvSpPr>
+            <p:cNvPr id="8" name="Rectangle 7">
+              <a:extLst>
+                <a:ext uri="{FF2B5EF4-FFF2-40B4-BE49-F238E27FC236}">
+                  <a16:creationId xmlns:a16="http://schemas.microsoft.com/office/drawing/2014/main" id="{900AEFAC-075C-463C-AD57-8F2E1A91D8D0}"/>
+                </a:ext>
+              </a:extLst>
+            </p:cNvPr>
+            <p:cNvSpPr/>
+            <p:nvPr/>
+          </p:nvSpPr>
+          <p:spPr>
+            <a:xfrm>
+              <a:off x="4085211" y="4648861"/>
+              <a:ext cx="1228725" cy="1099185"/>
+            </a:xfrm>
+            <a:prstGeom prst="rect">
+              <a:avLst/>
+            </a:prstGeom>
+            <a:noFill/>
+            <a:ln>
+              <a:solidFill>
+                <a:schemeClr val="tx1"/>
+              </a:solidFill>
+            </a:ln>
+          </p:spPr>
+          <p:style>
+            <a:lnRef idx="2">
+              <a:schemeClr val="accent1">
+                <a:shade val="50000"/>
+              </a:schemeClr>
+            </a:lnRef>
+            <a:fillRef idx="1">
+              <a:schemeClr val="accent1"/>
+            </a:fillRef>
+            <a:effectRef idx="0">
+              <a:schemeClr val="accent1"/>
+            </a:effectRef>
+            <a:fontRef idx="minor">
+              <a:schemeClr val="lt1"/>
+            </a:fontRef>
+          </p:style>
+          <p:txBody>
+            <a:bodyPr rot="0" spcFirstLastPara="0" vert="horz" wrap="square" lIns="91440" tIns="45720" rIns="91440" bIns="45720" numCol="1" spcCol="0" rtlCol="0" fromWordArt="0" anchor="b" anchorCtr="0" forceAA="0" compatLnSpc="1">
+              <a:prstTxWarp prst="textNoShape">
+                <a:avLst/>
+              </a:prstTxWarp>
+              <a:noAutofit/>
+            </a:bodyPr>
+            <a:lstStyle/>
+            <a:p>
+              <a:pPr algn="ctr"/>
+              <a:r>
+                <a:rPr lang="en-US" sz="1600" dirty="0">
+                  <a:solidFill>
+                    <a:schemeClr val="tx1"/>
+                  </a:solidFill>
+                </a:rPr>
+                <a:t>Client</a:t>
+              </a:r>
+            </a:p>
+          </p:txBody>
+        </p:sp>
+        <p:pic>
+          <p:nvPicPr>
+            <p:cNvPr id="9" name="Picture 2">
+              <a:extLst>
+                <a:ext uri="{FF2B5EF4-FFF2-40B4-BE49-F238E27FC236}">
+                  <a16:creationId xmlns:a16="http://schemas.microsoft.com/office/drawing/2014/main" id="{C8C0F850-772F-4EB5-B210-1B1F10E8DD9E}"/>
+                </a:ext>
+              </a:extLst>
+            </p:cNvPr>
+            <p:cNvPicPr>
+              <a:picLocks noChangeAspect="1" noChangeArrowheads="1"/>
+            </p:cNvPicPr>
+            <p:nvPr/>
+          </p:nvPicPr>
+          <p:blipFill>
+            <a:blip r:embed="rId3">
+              <a:extLst>
+                <a:ext uri="{28A0092B-C50C-407E-A947-70E740481C1C}">
+                  <a14:useLocalDpi xmlns:a14="http://schemas.microsoft.com/office/drawing/2010/main" val="0"/>
+                </a:ext>
+              </a:extLst>
+            </a:blip>
+            <a:srcRect/>
+            <a:stretch>
+              <a:fillRect/>
+            </a:stretch>
+          </p:blipFill>
+          <p:spPr bwMode="auto">
+            <a:xfrm>
+              <a:off x="4427018" y="4768685"/>
+              <a:ext cx="547318" cy="547318"/>
+            </a:xfrm>
+            <a:prstGeom prst="rect">
+              <a:avLst/>
+            </a:prstGeom>
+            <a:noFill/>
+            <a:extLst>
+              <a:ext uri="{909E8E84-426E-40DD-AFC4-6F175D3DCCD1}">
+                <a14:hiddenFill xmlns:a14="http://schemas.microsoft.com/office/drawing/2010/main">
+                  <a:solidFill>
+                    <a:srgbClr val="FFFFFF"/>
+                  </a:solidFill>
+                </a14:hiddenFill>
+              </a:ext>
+            </a:extLst>
+          </p:spPr>
+        </p:pic>
+      </p:grpSp>
+      <p:grpSp>
+        <p:nvGrpSpPr>
+          <p:cNvPr id="10" name="Groupe 37">
+            <a:extLst>
+              <a:ext uri="{FF2B5EF4-FFF2-40B4-BE49-F238E27FC236}">
+                <a16:creationId xmlns:a16="http://schemas.microsoft.com/office/drawing/2014/main" id="{5E93AE40-18E4-45E5-9D30-8B71B8B70C60}"/>
+              </a:ext>
+            </a:extLst>
+          </p:cNvPr>
+          <p:cNvGrpSpPr/>
+          <p:nvPr/>
+        </p:nvGrpSpPr>
+        <p:grpSpPr>
+          <a:xfrm>
+            <a:off x="4073948" y="345085"/>
+            <a:ext cx="1228725" cy="1099185"/>
+            <a:chOff x="3419872" y="1700808"/>
+            <a:chExt cx="1228725" cy="1099185"/>
+          </a:xfrm>
+        </p:grpSpPr>
+        <p:pic>
+          <p:nvPicPr>
+            <p:cNvPr id="11" name="Picture 2" descr="RÃ©sultat de recherche d'images pour &quot;oauth 2.0&quot;">
+              <a:extLst>
+                <a:ext uri="{FF2B5EF4-FFF2-40B4-BE49-F238E27FC236}">
+                  <a16:creationId xmlns:a16="http://schemas.microsoft.com/office/drawing/2014/main" id="{0D6F4E4B-486B-4BAE-8FD8-61829B36F779}"/>
+                </a:ext>
+              </a:extLst>
+            </p:cNvPr>
+            <p:cNvPicPr>
+              <a:picLocks noChangeAspect="1" noChangeArrowheads="1"/>
+            </p:cNvPicPr>
+            <p:nvPr/>
+          </p:nvPicPr>
+          <p:blipFill>
+            <a:blip r:embed="rId4" cstate="print">
+              <a:extLst>
+                <a:ext uri="{28A0092B-C50C-407E-A947-70E740481C1C}">
+                  <a14:useLocalDpi xmlns:a14="http://schemas.microsoft.com/office/drawing/2010/main" val="0"/>
+                </a:ext>
+              </a:extLst>
+            </a:blip>
+            <a:srcRect/>
+            <a:stretch>
+              <a:fillRect/>
+            </a:stretch>
+          </p:blipFill>
+          <p:spPr bwMode="auto">
+            <a:xfrm>
+              <a:off x="3674194" y="1772816"/>
+              <a:ext cx="720080" cy="717165"/>
+            </a:xfrm>
+            <a:prstGeom prst="rect">
+              <a:avLst/>
+            </a:prstGeom>
+            <a:noFill/>
+            <a:extLst>
+              <a:ext uri="{909E8E84-426E-40DD-AFC4-6F175D3DCCD1}">
+                <a14:hiddenFill xmlns:a14="http://schemas.microsoft.com/office/drawing/2010/main">
+                  <a:solidFill>
+                    <a:srgbClr val="FFFFFF"/>
+                  </a:solidFill>
+                </a14:hiddenFill>
+              </a:ext>
+            </a:extLst>
+          </p:spPr>
+        </p:pic>
+        <p:sp>
+          <p:nvSpPr>
+            <p:cNvPr id="12" name="Rectangle 11">
+              <a:extLst>
+                <a:ext uri="{FF2B5EF4-FFF2-40B4-BE49-F238E27FC236}">
+                  <a16:creationId xmlns:a16="http://schemas.microsoft.com/office/drawing/2014/main" id="{E42B968D-F207-46B4-A07C-E8F735674CBD}"/>
+                </a:ext>
+              </a:extLst>
+            </p:cNvPr>
+            <p:cNvSpPr/>
+            <p:nvPr/>
+          </p:nvSpPr>
+          <p:spPr>
+            <a:xfrm>
+              <a:off x="3419872" y="1700808"/>
+              <a:ext cx="1228725" cy="1099185"/>
+            </a:xfrm>
+            <a:prstGeom prst="rect">
+              <a:avLst/>
+            </a:prstGeom>
+            <a:noFill/>
+            <a:ln>
+              <a:solidFill>
+                <a:schemeClr val="tx1"/>
+              </a:solidFill>
+            </a:ln>
+          </p:spPr>
+          <p:style>
+            <a:lnRef idx="2">
+              <a:schemeClr val="accent1">
+                <a:shade val="50000"/>
+              </a:schemeClr>
+            </a:lnRef>
+            <a:fillRef idx="1">
+              <a:schemeClr val="accent1"/>
+            </a:fillRef>
+            <a:effectRef idx="0">
+              <a:schemeClr val="accent1"/>
+            </a:effectRef>
+            <a:fontRef idx="minor">
+              <a:schemeClr val="lt1"/>
+            </a:fontRef>
+          </p:style>
+          <p:txBody>
+            <a:bodyPr rot="0" spcFirstLastPara="0" vert="horz" wrap="square" lIns="91440" tIns="45720" rIns="91440" bIns="45720" numCol="1" spcCol="0" rtlCol="0" fromWordArt="0" anchor="b" anchorCtr="0" forceAA="0" compatLnSpc="1">
+              <a:prstTxWarp prst="textNoShape">
+                <a:avLst/>
+              </a:prstTxWarp>
+              <a:noAutofit/>
+            </a:bodyPr>
+            <a:lstStyle/>
+            <a:p>
+              <a:pPr algn="ctr"/>
+              <a:r>
+                <a:rPr lang="en-US" sz="1600" dirty="0">
+                  <a:solidFill>
+                    <a:schemeClr val="tx1"/>
+                  </a:solidFill>
+                </a:rPr>
+                <a:t>OAUTH2.0</a:t>
+              </a:r>
+            </a:p>
+          </p:txBody>
+        </p:sp>
+      </p:grpSp>
+      <p:cxnSp>
+        <p:nvCxnSpPr>
+          <p:cNvPr id="17" name="Connecteur : en angle 16">
+            <a:extLst>
+              <a:ext uri="{FF2B5EF4-FFF2-40B4-BE49-F238E27FC236}">
+                <a16:creationId xmlns:a16="http://schemas.microsoft.com/office/drawing/2014/main" id="{5AABE693-5528-4D9A-B7CA-BADCFE5D86FD}"/>
+              </a:ext>
+            </a:extLst>
+          </p:cNvPr>
+          <p:cNvCxnSpPr>
+            <a:stCxn id="8" idx="1"/>
+            <a:endCxn id="12" idx="1"/>
+          </p:cNvCxnSpPr>
+          <p:nvPr/>
+        </p:nvCxnSpPr>
+        <p:spPr>
+          <a:xfrm rot="10800000">
+            <a:off x="4073949" y="894678"/>
+            <a:ext cx="11263" cy="4303776"/>
+          </a:xfrm>
+          <a:prstGeom prst="bentConnector3">
+            <a:avLst>
+              <a:gd name="adj1" fmla="val 3897709"/>
+            </a:avLst>
+          </a:prstGeom>
+          <a:ln>
+            <a:solidFill>
+              <a:schemeClr val="tx1"/>
+            </a:solidFill>
+            <a:headEnd type="triangle"/>
+            <a:tailEnd type="triangle"/>
+          </a:ln>
+        </p:spPr>
+        <p:style>
+          <a:lnRef idx="1">
+            <a:schemeClr val="accent1"/>
+          </a:lnRef>
+          <a:fillRef idx="0">
+            <a:schemeClr val="accent1"/>
+          </a:fillRef>
+          <a:effectRef idx="0">
+            <a:schemeClr val="accent1"/>
+          </a:effectRef>
+          <a:fontRef idx="minor">
+            <a:schemeClr val="tx1"/>
+          </a:fontRef>
+        </p:style>
+      </p:cxnSp>
+      <p:sp>
+        <p:nvSpPr>
+          <p:cNvPr id="19" name="Flowchart: Connector 48">
+            <a:extLst>
+              <a:ext uri="{FF2B5EF4-FFF2-40B4-BE49-F238E27FC236}">
+                <a16:creationId xmlns:a16="http://schemas.microsoft.com/office/drawing/2014/main" id="{FB13C4FA-342C-485B-8024-D372E1759A3F}"/>
+              </a:ext>
+            </a:extLst>
+          </p:cNvPr>
+          <p:cNvSpPr>
+            <a:spLocks noChangeAspect="1"/>
+          </p:cNvSpPr>
+          <p:nvPr/>
+        </p:nvSpPr>
+        <p:spPr>
+          <a:xfrm>
+            <a:off x="3560733" y="2960860"/>
+            <a:ext cx="171409" cy="171409"/>
+          </a:xfrm>
+          <a:prstGeom prst="flowChartConnector">
+            <a:avLst/>
+          </a:prstGeom>
+          <a:solidFill>
+            <a:schemeClr val="tx1"/>
+          </a:solidFill>
+          <a:ln>
+            <a:solidFill>
+              <a:schemeClr val="tx1"/>
+            </a:solidFill>
+          </a:ln>
+        </p:spPr>
+        <p:style>
+          <a:lnRef idx="2">
+            <a:schemeClr val="accent1">
+              <a:shade val="50000"/>
+            </a:schemeClr>
+          </a:lnRef>
+          <a:fillRef idx="1">
+            <a:schemeClr val="accent1"/>
+          </a:fillRef>
+          <a:effectRef idx="0">
+            <a:schemeClr val="accent1"/>
+          </a:effectRef>
+          <a:fontRef idx="minor">
+            <a:schemeClr val="lt1"/>
+          </a:fontRef>
+        </p:style>
+        <p:txBody>
+          <a:bodyPr rtlCol="0" anchor="ctr"/>
+          <a:lstStyle>
+            <a:defPPr>
+              <a:defRPr lang="en-US"/>
+            </a:defPPr>
+            <a:lvl1pPr marL="0" algn="l" defTabSz="914400" rtl="0" eaLnBrk="1" latinLnBrk="0" hangingPunct="1">
+              <a:defRPr sz="1800" kern="1200">
+                <a:solidFill>
+                  <a:schemeClr val="lt1"/>
+                </a:solidFill>
+                <a:latin typeface="+mn-lt"/>
+                <a:ea typeface="+mn-ea"/>
+                <a:cs typeface="+mn-cs"/>
+              </a:defRPr>
+            </a:lvl1pPr>
+            <a:lvl2pPr marL="457200" algn="l" defTabSz="914400" rtl="0" eaLnBrk="1" latinLnBrk="0" hangingPunct="1">
+              <a:defRPr sz="1800" kern="1200">
+                <a:solidFill>
+                  <a:schemeClr val="lt1"/>
+                </a:solidFill>
+                <a:latin typeface="+mn-lt"/>
+                <a:ea typeface="+mn-ea"/>
+                <a:cs typeface="+mn-cs"/>
+              </a:defRPr>
+            </a:lvl2pPr>
+            <a:lvl3pPr marL="914400" algn="l" defTabSz="914400" rtl="0" eaLnBrk="1" latinLnBrk="0" hangingPunct="1">
+              <a:defRPr sz="1800" kern="1200">
+                <a:solidFill>
+                  <a:schemeClr val="lt1"/>
+                </a:solidFill>
+                <a:latin typeface="+mn-lt"/>
+                <a:ea typeface="+mn-ea"/>
+                <a:cs typeface="+mn-cs"/>
+              </a:defRPr>
+            </a:lvl3pPr>
+            <a:lvl4pPr marL="1371600" algn="l" defTabSz="914400" rtl="0" eaLnBrk="1" latinLnBrk="0" hangingPunct="1">
+              <a:defRPr sz="1800" kern="1200">
+                <a:solidFill>
+                  <a:schemeClr val="lt1"/>
+                </a:solidFill>
+                <a:latin typeface="+mn-lt"/>
+                <a:ea typeface="+mn-ea"/>
+                <a:cs typeface="+mn-cs"/>
+              </a:defRPr>
+            </a:lvl4pPr>
+            <a:lvl5pPr marL="1828800" algn="l" defTabSz="914400" rtl="0" eaLnBrk="1" latinLnBrk="0" hangingPunct="1">
+              <a:defRPr sz="1800" kern="1200">
+                <a:solidFill>
+                  <a:schemeClr val="lt1"/>
+                </a:solidFill>
+                <a:latin typeface="+mn-lt"/>
+                <a:ea typeface="+mn-ea"/>
+                <a:cs typeface="+mn-cs"/>
+              </a:defRPr>
+            </a:lvl5pPr>
+            <a:lvl6pPr marL="2286000" algn="l" defTabSz="914400" rtl="0" eaLnBrk="1" latinLnBrk="0" hangingPunct="1">
+              <a:defRPr sz="1800" kern="1200">
+                <a:solidFill>
+                  <a:schemeClr val="lt1"/>
+                </a:solidFill>
+                <a:latin typeface="+mn-lt"/>
+                <a:ea typeface="+mn-ea"/>
+                <a:cs typeface="+mn-cs"/>
+              </a:defRPr>
+            </a:lvl6pPr>
+            <a:lvl7pPr marL="2743200" algn="l" defTabSz="914400" rtl="0" eaLnBrk="1" latinLnBrk="0" hangingPunct="1">
+              <a:defRPr sz="1800" kern="1200">
+                <a:solidFill>
+                  <a:schemeClr val="lt1"/>
+                </a:solidFill>
+                <a:latin typeface="+mn-lt"/>
+                <a:ea typeface="+mn-ea"/>
+                <a:cs typeface="+mn-cs"/>
+              </a:defRPr>
+            </a:lvl7pPr>
+            <a:lvl8pPr marL="3200400" algn="l" defTabSz="914400" rtl="0" eaLnBrk="1" latinLnBrk="0" hangingPunct="1">
+              <a:defRPr sz="1800" kern="1200">
+                <a:solidFill>
+                  <a:schemeClr val="lt1"/>
+                </a:solidFill>
+                <a:latin typeface="+mn-lt"/>
+                <a:ea typeface="+mn-ea"/>
+                <a:cs typeface="+mn-cs"/>
+              </a:defRPr>
+            </a:lvl8pPr>
+            <a:lvl9pPr marL="3657600" algn="l" defTabSz="914400" rtl="0" eaLnBrk="1" latinLnBrk="0" hangingPunct="1">
+              <a:defRPr sz="1800" kern="1200">
+                <a:solidFill>
+                  <a:schemeClr val="lt1"/>
+                </a:solidFill>
+                <a:latin typeface="+mn-lt"/>
+                <a:ea typeface="+mn-ea"/>
+                <a:cs typeface="+mn-cs"/>
+              </a:defRPr>
+            </a:lvl9pPr>
+          </a:lstStyle>
+          <a:p>
+            <a:pPr algn="ctr"/>
+            <a:r>
+              <a:rPr lang="en-US" sz="1200" b="1" dirty="0"/>
+              <a:t>1</a:t>
+            </a:r>
+            <a:endParaRPr lang="en-US" b="1" dirty="0"/>
+          </a:p>
+        </p:txBody>
+      </p:sp>
+      <p:sp>
+        <p:nvSpPr>
+          <p:cNvPr id="21" name="TextBox 64">
+            <a:extLst>
+              <a:ext uri="{FF2B5EF4-FFF2-40B4-BE49-F238E27FC236}">
+                <a16:creationId xmlns:a16="http://schemas.microsoft.com/office/drawing/2014/main" id="{FE18CAA1-6848-4DFE-A041-93A7BF8F1897}"/>
+              </a:ext>
+            </a:extLst>
+          </p:cNvPr>
+          <p:cNvSpPr txBox="1"/>
+          <p:nvPr/>
+        </p:nvSpPr>
+        <p:spPr>
+          <a:xfrm>
+            <a:off x="2060997" y="3079401"/>
+            <a:ext cx="1769893" cy="1015663"/>
+          </a:xfrm>
+          <a:prstGeom prst="rect">
+            <a:avLst/>
+          </a:prstGeom>
+          <a:noFill/>
+        </p:spPr>
+        <p:txBody>
+          <a:bodyPr wrap="square" rtlCol="0">
+            <a:spAutoFit/>
+          </a:bodyPr>
+          <a:lstStyle/>
+          <a:p>
+            <a:r>
+              <a:rPr lang="en-US" sz="1200" dirty="0"/>
+              <a:t>Use </a:t>
+            </a:r>
+            <a:r>
+              <a:rPr lang="en-US" sz="1200" dirty="0" err="1"/>
+              <a:t>client_credentials</a:t>
+            </a:r>
+            <a:r>
+              <a:rPr lang="en-US" sz="1200" dirty="0"/>
+              <a:t> grant-type to get an access token </a:t>
+            </a:r>
+            <a:r>
+              <a:rPr lang="en-US" sz="1200" dirty="0" err="1"/>
+              <a:t>valids</a:t>
+            </a:r>
+            <a:r>
+              <a:rPr lang="en-US" sz="1200" dirty="0"/>
+              <a:t> on the scopes </a:t>
+            </a:r>
+            <a:r>
+              <a:rPr lang="en-US" sz="1200" dirty="0" err="1"/>
+              <a:t>get_user</a:t>
+            </a:r>
+            <a:r>
+              <a:rPr lang="en-US" sz="1200" dirty="0"/>
+              <a:t> and </a:t>
+            </a:r>
+            <a:r>
+              <a:rPr lang="en-US" sz="1200" dirty="0" err="1"/>
+              <a:t>add_user</a:t>
+            </a:r>
+            <a:endParaRPr lang="en-US" sz="1200" dirty="0"/>
+          </a:p>
+        </p:txBody>
+      </p:sp>
+      <p:cxnSp>
+        <p:nvCxnSpPr>
+          <p:cNvPr id="23" name="Connecteur droit avec flèche 22">
+            <a:extLst>
+              <a:ext uri="{FF2B5EF4-FFF2-40B4-BE49-F238E27FC236}">
+                <a16:creationId xmlns:a16="http://schemas.microsoft.com/office/drawing/2014/main" id="{DC4877C9-2D0E-4612-8CDA-EA32AFC6E6C1}"/>
+              </a:ext>
+            </a:extLst>
+          </p:cNvPr>
+          <p:cNvCxnSpPr>
+            <a:stCxn id="8" idx="0"/>
+            <a:endCxn id="5" idx="2"/>
+          </p:cNvCxnSpPr>
+          <p:nvPr/>
+        </p:nvCxnSpPr>
+        <p:spPr>
+          <a:xfrm flipV="1">
+            <a:off x="4699574" y="3596158"/>
+            <a:ext cx="0" cy="1052703"/>
+          </a:xfrm>
+          <a:prstGeom prst="straightConnector1">
+            <a:avLst/>
+          </a:prstGeom>
+          <a:ln>
+            <a:solidFill>
+              <a:schemeClr val="tx1"/>
+            </a:solidFill>
+            <a:headEnd type="triangle"/>
+            <a:tailEnd type="triangle"/>
+          </a:ln>
+        </p:spPr>
+        <p:style>
+          <a:lnRef idx="1">
+            <a:schemeClr val="accent1"/>
+          </a:lnRef>
+          <a:fillRef idx="0">
+            <a:schemeClr val="accent1"/>
+          </a:fillRef>
+          <a:effectRef idx="0">
+            <a:schemeClr val="accent1"/>
+          </a:effectRef>
+          <a:fontRef idx="minor">
+            <a:schemeClr val="tx1"/>
+          </a:fontRef>
+        </p:style>
+      </p:cxnSp>
+      <p:sp>
+        <p:nvSpPr>
+          <p:cNvPr id="24" name="Flowchart: Connector 48">
+            <a:extLst>
+              <a:ext uri="{FF2B5EF4-FFF2-40B4-BE49-F238E27FC236}">
+                <a16:creationId xmlns:a16="http://schemas.microsoft.com/office/drawing/2014/main" id="{8ADDAD05-D4CC-4683-A439-0234048FFE59}"/>
+              </a:ext>
+            </a:extLst>
+          </p:cNvPr>
+          <p:cNvSpPr>
+            <a:spLocks noChangeAspect="1"/>
+          </p:cNvSpPr>
+          <p:nvPr/>
+        </p:nvSpPr>
+        <p:spPr>
+          <a:xfrm>
+            <a:off x="4613868" y="4045409"/>
+            <a:ext cx="171409" cy="171409"/>
+          </a:xfrm>
+          <a:prstGeom prst="flowChartConnector">
+            <a:avLst/>
+          </a:prstGeom>
+          <a:solidFill>
+            <a:schemeClr val="tx1"/>
+          </a:solidFill>
+          <a:ln>
+            <a:solidFill>
+              <a:schemeClr val="tx1"/>
+            </a:solidFill>
+          </a:ln>
+        </p:spPr>
+        <p:style>
+          <a:lnRef idx="2">
+            <a:schemeClr val="accent1">
+              <a:shade val="50000"/>
+            </a:schemeClr>
+          </a:lnRef>
+          <a:fillRef idx="1">
+            <a:schemeClr val="accent1"/>
+          </a:fillRef>
+          <a:effectRef idx="0">
+            <a:schemeClr val="accent1"/>
+          </a:effectRef>
+          <a:fontRef idx="minor">
+            <a:schemeClr val="lt1"/>
+          </a:fontRef>
+        </p:style>
+        <p:txBody>
+          <a:bodyPr rtlCol="0" anchor="ctr"/>
+          <a:lstStyle>
+            <a:defPPr>
+              <a:defRPr lang="en-US"/>
+            </a:defPPr>
+            <a:lvl1pPr marL="0" algn="l" defTabSz="914400" rtl="0" eaLnBrk="1" latinLnBrk="0" hangingPunct="1">
+              <a:defRPr sz="1800" kern="1200">
+                <a:solidFill>
+                  <a:schemeClr val="lt1"/>
+                </a:solidFill>
+                <a:latin typeface="+mn-lt"/>
+                <a:ea typeface="+mn-ea"/>
+                <a:cs typeface="+mn-cs"/>
+              </a:defRPr>
+            </a:lvl1pPr>
+            <a:lvl2pPr marL="457200" algn="l" defTabSz="914400" rtl="0" eaLnBrk="1" latinLnBrk="0" hangingPunct="1">
+              <a:defRPr sz="1800" kern="1200">
+                <a:solidFill>
+                  <a:schemeClr val="lt1"/>
+                </a:solidFill>
+                <a:latin typeface="+mn-lt"/>
+                <a:ea typeface="+mn-ea"/>
+                <a:cs typeface="+mn-cs"/>
+              </a:defRPr>
+            </a:lvl2pPr>
+            <a:lvl3pPr marL="914400" algn="l" defTabSz="914400" rtl="0" eaLnBrk="1" latinLnBrk="0" hangingPunct="1">
+              <a:defRPr sz="1800" kern="1200">
+                <a:solidFill>
+                  <a:schemeClr val="lt1"/>
+                </a:solidFill>
+                <a:latin typeface="+mn-lt"/>
+                <a:ea typeface="+mn-ea"/>
+                <a:cs typeface="+mn-cs"/>
+              </a:defRPr>
+            </a:lvl3pPr>
+            <a:lvl4pPr marL="1371600" algn="l" defTabSz="914400" rtl="0" eaLnBrk="1" latinLnBrk="0" hangingPunct="1">
+              <a:defRPr sz="1800" kern="1200">
+                <a:solidFill>
+                  <a:schemeClr val="lt1"/>
+                </a:solidFill>
+                <a:latin typeface="+mn-lt"/>
+                <a:ea typeface="+mn-ea"/>
+                <a:cs typeface="+mn-cs"/>
+              </a:defRPr>
+            </a:lvl4pPr>
+            <a:lvl5pPr marL="1828800" algn="l" defTabSz="914400" rtl="0" eaLnBrk="1" latinLnBrk="0" hangingPunct="1">
+              <a:defRPr sz="1800" kern="1200">
+                <a:solidFill>
+                  <a:schemeClr val="lt1"/>
+                </a:solidFill>
+                <a:latin typeface="+mn-lt"/>
+                <a:ea typeface="+mn-ea"/>
+                <a:cs typeface="+mn-cs"/>
+              </a:defRPr>
+            </a:lvl5pPr>
+            <a:lvl6pPr marL="2286000" algn="l" defTabSz="914400" rtl="0" eaLnBrk="1" latinLnBrk="0" hangingPunct="1">
+              <a:defRPr sz="1800" kern="1200">
+                <a:solidFill>
+                  <a:schemeClr val="lt1"/>
+                </a:solidFill>
+                <a:latin typeface="+mn-lt"/>
+                <a:ea typeface="+mn-ea"/>
+                <a:cs typeface="+mn-cs"/>
+              </a:defRPr>
+            </a:lvl6pPr>
+            <a:lvl7pPr marL="2743200" algn="l" defTabSz="914400" rtl="0" eaLnBrk="1" latinLnBrk="0" hangingPunct="1">
+              <a:defRPr sz="1800" kern="1200">
+                <a:solidFill>
+                  <a:schemeClr val="lt1"/>
+                </a:solidFill>
+                <a:latin typeface="+mn-lt"/>
+                <a:ea typeface="+mn-ea"/>
+                <a:cs typeface="+mn-cs"/>
+              </a:defRPr>
+            </a:lvl7pPr>
+            <a:lvl8pPr marL="3200400" algn="l" defTabSz="914400" rtl="0" eaLnBrk="1" latinLnBrk="0" hangingPunct="1">
+              <a:defRPr sz="1800" kern="1200">
+                <a:solidFill>
+                  <a:schemeClr val="lt1"/>
+                </a:solidFill>
+                <a:latin typeface="+mn-lt"/>
+                <a:ea typeface="+mn-ea"/>
+                <a:cs typeface="+mn-cs"/>
+              </a:defRPr>
+            </a:lvl8pPr>
+            <a:lvl9pPr marL="3657600" algn="l" defTabSz="914400" rtl="0" eaLnBrk="1" latinLnBrk="0" hangingPunct="1">
+              <a:defRPr sz="1800" kern="1200">
+                <a:solidFill>
+                  <a:schemeClr val="lt1"/>
+                </a:solidFill>
+                <a:latin typeface="+mn-lt"/>
+                <a:ea typeface="+mn-ea"/>
+                <a:cs typeface="+mn-cs"/>
+              </a:defRPr>
+            </a:lvl9pPr>
+          </a:lstStyle>
+          <a:p>
+            <a:pPr algn="ctr"/>
+            <a:r>
+              <a:rPr lang="en-US" sz="1200" b="1" dirty="0"/>
+              <a:t>2</a:t>
+            </a:r>
+            <a:endParaRPr lang="en-US" b="1" dirty="0"/>
+          </a:p>
+        </p:txBody>
+      </p:sp>
+      <p:sp>
+        <p:nvSpPr>
+          <p:cNvPr id="25" name="TextBox 64">
+            <a:extLst>
+              <a:ext uri="{FF2B5EF4-FFF2-40B4-BE49-F238E27FC236}">
+                <a16:creationId xmlns:a16="http://schemas.microsoft.com/office/drawing/2014/main" id="{D8C7344B-4682-46FD-B5FD-3FB6BE4C5083}"/>
+              </a:ext>
+            </a:extLst>
+          </p:cNvPr>
+          <p:cNvSpPr txBox="1"/>
+          <p:nvPr/>
+        </p:nvSpPr>
+        <p:spPr>
+          <a:xfrm>
+            <a:off x="4876329" y="3614677"/>
+            <a:ext cx="1769893" cy="646331"/>
+          </a:xfrm>
+          <a:prstGeom prst="rect">
+            <a:avLst/>
+          </a:prstGeom>
+          <a:noFill/>
+        </p:spPr>
+        <p:txBody>
+          <a:bodyPr wrap="square" rtlCol="0">
+            <a:spAutoFit/>
+          </a:bodyPr>
+          <a:lstStyle/>
+          <a:p>
+            <a:r>
+              <a:rPr lang="en-US" sz="1200" dirty="0"/>
+              <a:t>Pass the access token in the Authorization header to get and </a:t>
+            </a:r>
+            <a:r>
+              <a:rPr lang="en-US" sz="1200"/>
+              <a:t>add users.</a:t>
+            </a:r>
+            <a:endParaRPr lang="en-US" sz="1200" dirty="0"/>
+          </a:p>
+        </p:txBody>
+      </p:sp>
+    </p:spTree>
+    <p:extLst>
+      <p:ext uri="{BB962C8B-B14F-4D97-AF65-F5344CB8AC3E}">
+        <p14:creationId xmlns:p14="http://schemas.microsoft.com/office/powerpoint/2010/main" val="2764307213"/>
+      </p:ext>
+    </p:extLst>
+  </p:cSld>
+  <p:clrMapOvr>
+    <a:masterClrMapping/>
+  </p:clrMapOvr>
+</p:sld>
+</file>
+
 <file path=ppt/theme/theme1.xml><?xml version="1.0" encoding="utf-8"?>
 <a:theme xmlns:a="http://schemas.openxmlformats.org/drawingml/2006/main" name="Thème Office">
   <a:themeElements>

</xml_diff>